<commit_message>
Basic simulation initialization complete
</commit_message>
<xml_diff>
--- a/Presentation/CS4491 Poster.pptx
+++ b/Presentation/CS4491 Poster.pptx
@@ -516,7 +516,7 @@
               <a:pPr>
                 <a:defRPr/>
               </a:pPr>
-              <a:t>4/16/2015</a:t>
+              <a:t>4/18/2015</a:t>
             </a:fld>
             <a:endParaRPr lang="en-US"/>
           </a:p>
@@ -9005,7 +9005,7 @@
                 </a:solidFill>
                 <a:latin typeface="+mj-lt"/>
               </a:rPr>
-              <a:t>How can a discrete event simulation be implemented to simulate traffic? The following outlines the development of a discrete event traffic simulation. Development consisted of devising a routing algorithm, and designing concurrent software.</a:t>
+              <a:t>The following outlines the development of a discrete event traffic simulation. Development consisted of devising a routing algorithm, and designing concurrent software.</a:t>
             </a:r>
           </a:p>
         </p:txBody>
@@ -9064,7 +9064,7 @@
                 </a:solidFill>
                 <a:latin typeface="+mj-lt"/>
               </a:rPr>
-              <a:t>How can a discrete event simulation be implemented to simulate traffic? The following outlines the development of a discrete event traffic simulation. Development consisted of devising a routing algorithm, and designing concurrent software.</a:t>
+              <a:t>.</a:t>
             </a:r>
           </a:p>
         </p:txBody>
@@ -9210,6 +9210,65 @@
           </a:prstGeom>
         </p:spPr>
       </p:pic>
+      <p:sp>
+        <p:nvSpPr>
+          <p:cNvPr id="12" name="TextBox 11"/>
+          <p:cNvSpPr txBox="1">
+            <a:spLocks/>
+          </p:cNvSpPr>
+          <p:nvPr/>
+        </p:nvSpPr>
+        <p:spPr>
+          <a:xfrm>
+            <a:off x="11810999" y="4267200"/>
+            <a:ext cx="20269202" cy="8610600"/>
+          </a:xfrm>
+          <a:prstGeom prst="rect">
+            <a:avLst/>
+          </a:prstGeom>
+          <a:solidFill>
+            <a:schemeClr val="bg2"/>
+          </a:solidFill>
+        </p:spPr>
+        <p:txBody>
+          <a:bodyPr wrap="square" lIns="457200" tIns="228600" rIns="457200" bIns="228600" rtlCol="0">
+            <a:noAutofit/>
+          </a:bodyPr>
+          <a:lstStyle/>
+          <a:p>
+            <a:pPr>
+              <a:lnSpc>
+                <a:spcPct val="100000"/>
+              </a:lnSpc>
+            </a:pPr>
+            <a:r>
+              <a:rPr lang="en-US" b="0" dirty="0" smtClean="0">
+                <a:solidFill>
+                  <a:schemeClr val="accent1"/>
+                </a:solidFill>
+                <a:latin typeface="+mj-lt"/>
+              </a:rPr>
+              <a:t>Routing Algorithm</a:t>
+            </a:r>
+          </a:p>
+          <a:p>
+            <a:pPr algn="l">
+              <a:lnSpc>
+                <a:spcPct val="100000"/>
+              </a:lnSpc>
+            </a:pPr>
+            <a:r>
+              <a:rPr lang="en-US" sz="3600" b="0" dirty="0" smtClean="0">
+                <a:solidFill>
+                  <a:schemeClr val="accent1"/>
+                </a:solidFill>
+                <a:latin typeface="+mj-lt"/>
+              </a:rPr>
+              <a:t>.</a:t>
+            </a:r>
+          </a:p>
+        </p:txBody>
+      </p:sp>
     </p:spTree>
   </p:cSld>
   <p:clrMapOvr>

</xml_diff>

<commit_message>
further edits to cs4491 poster
</commit_message>
<xml_diff>
--- a/Presentation/CS4491 Poster.pptx
+++ b/Presentation/CS4491 Poster.pptx
@@ -516,7 +516,7 @@
               <a:pPr>
                 <a:defRPr/>
               </a:pPr>
-              <a:t>4/18/2015</a:t>
+              <a:t>4/19/2015</a:t>
             </a:fld>
             <a:endParaRPr lang="en-US"/>
           </a:p>
@@ -9269,6 +9269,101 @@
           </a:p>
         </p:txBody>
       </p:sp>
+      <p:sp>
+        <p:nvSpPr>
+          <p:cNvPr id="13" name="TextBox 12"/>
+          <p:cNvSpPr txBox="1">
+            <a:spLocks/>
+          </p:cNvSpPr>
+          <p:nvPr/>
+        </p:nvSpPr>
+        <p:spPr>
+          <a:xfrm>
+            <a:off x="11780519" y="13620530"/>
+            <a:ext cx="14554200" cy="8420100"/>
+          </a:xfrm>
+          <a:prstGeom prst="rect">
+            <a:avLst/>
+          </a:prstGeom>
+          <a:solidFill>
+            <a:schemeClr val="bg2"/>
+          </a:solidFill>
+        </p:spPr>
+        <p:txBody>
+          <a:bodyPr wrap="square" lIns="457200" tIns="228600" rIns="457200" bIns="228600" rtlCol="0">
+            <a:noAutofit/>
+          </a:bodyPr>
+          <a:lstStyle/>
+          <a:p>
+            <a:pPr>
+              <a:lnSpc>
+                <a:spcPct val="100000"/>
+              </a:lnSpc>
+            </a:pPr>
+            <a:r>
+              <a:rPr lang="en-US" b="0" dirty="0" smtClean="0">
+                <a:solidFill>
+                  <a:schemeClr val="accent1"/>
+                </a:solidFill>
+                <a:latin typeface="+mj-lt"/>
+              </a:rPr>
+              <a:t>The Interface so far</a:t>
+            </a:r>
+            <a:endParaRPr lang="en-US" b="0" dirty="0" smtClean="0">
+              <a:solidFill>
+                <a:schemeClr val="accent1"/>
+              </a:solidFill>
+              <a:latin typeface="+mj-lt"/>
+            </a:endParaRPr>
+          </a:p>
+          <a:p>
+            <a:pPr algn="l">
+              <a:lnSpc>
+                <a:spcPct val="100000"/>
+              </a:lnSpc>
+            </a:pPr>
+            <a:r>
+              <a:rPr lang="en-US" sz="3600" b="0" dirty="0" smtClean="0">
+                <a:solidFill>
+                  <a:schemeClr val="accent1"/>
+                </a:solidFill>
+                <a:latin typeface="+mj-lt"/>
+              </a:rPr>
+              <a:t>.</a:t>
+            </a:r>
+          </a:p>
+        </p:txBody>
+      </p:sp>
+      <p:pic>
+        <p:nvPicPr>
+          <p:cNvPr id="3" name="Picture 2"/>
+          <p:cNvPicPr>
+            <a:picLocks noChangeAspect="1"/>
+          </p:cNvPicPr>
+          <p:nvPr/>
+        </p:nvPicPr>
+        <p:blipFill>
+          <a:blip r:embed="rId5">
+            <a:extLst>
+              <a:ext uri="{28A0092B-C50C-407E-A947-70E740481C1C}">
+                <a14:useLocalDpi xmlns:a14="http://schemas.microsoft.com/office/drawing/2010/main" val="0"/>
+              </a:ext>
+            </a:extLst>
+          </a:blip>
+          <a:stretch>
+            <a:fillRect/>
+          </a:stretch>
+        </p:blipFill>
+        <p:spPr>
+          <a:xfrm>
+            <a:off x="12295807" y="15071724"/>
+            <a:ext cx="13523623" cy="6321206"/>
+          </a:xfrm>
+          <a:prstGeom prst="rect">
+            <a:avLst/>
+          </a:prstGeom>
+        </p:spPr>
+      </p:pic>
     </p:spTree>
   </p:cSld>
   <p:clrMapOvr>

</xml_diff>

<commit_message>
Finished final version of Poster
</commit_message>
<xml_diff>
--- a/Presentation/CS4491 Poster.pptx
+++ b/Presentation/CS4491 Poster.pptx
@@ -516,7 +516,7 @@
               <a:pPr>
                 <a:defRPr/>
               </a:pPr>
-              <a:t>4/20/2015</a:t>
+              <a:t>4/21/2015</a:t>
             </a:fld>
             <a:endParaRPr lang="en-US"/>
           </a:p>
@@ -8865,8 +8865,8 @@
         </p:nvSpPr>
         <p:spPr>
           <a:xfrm>
-            <a:off x="12710160" y="914400"/>
-            <a:ext cx="18470880" cy="2883866"/>
+            <a:off x="11240123" y="1125520"/>
+            <a:ext cx="21357450" cy="2426818"/>
           </a:xfrm>
           <a:prstGeom prst="rect">
             <a:avLst/>
@@ -8880,69 +8880,52 @@
           <a:lstStyle/>
           <a:p>
             <a:r>
-              <a:rPr lang="en-US" sz="8800" dirty="0">
+              <a:rPr lang="en-US" sz="6000" dirty="0" smtClean="0">
                 <a:solidFill>
                   <a:schemeClr val="accent1"/>
                 </a:solidFill>
                 <a:latin typeface="+mj-lt"/>
-                <a:cs typeface="Helvetica" panose="020B0604020202020204" pitchFamily="34" charset="0"/>
               </a:rPr>
-              <a:t>Object Oriented Traffic </a:t>
-            </a:r>
-            <a:r>
-              <a:rPr lang="en-US" sz="8800" dirty="0" smtClean="0">
+              <a:t>Street Network Performance Analysis Through Simulation</a:t>
+            </a:r>
+          </a:p>
+          <a:p>
+            <a:r>
+              <a:rPr lang="en-US" dirty="0" smtClean="0">
                 <a:solidFill>
                   <a:schemeClr val="accent1"/>
                 </a:solidFill>
                 <a:latin typeface="+mj-lt"/>
-                <a:cs typeface="Helvetica" panose="020B0604020202020204" pitchFamily="34" charset="0"/>
               </a:rPr>
-              <a:t>Simulation</a:t>
-            </a:r>
-            <a:endParaRPr lang="en-US" sz="8800" dirty="0" smtClean="0">
+              <a:t>By Nick Powers, and Jordan White</a:t>
+            </a:r>
+          </a:p>
+          <a:p>
+            <a:r>
+              <a:rPr lang="en-US" sz="4400" dirty="0" smtClean="0">
+                <a:solidFill>
+                  <a:schemeClr val="accent1"/>
+                </a:solidFill>
+                <a:latin typeface="+mj-lt"/>
+              </a:rPr>
+              <a:t>CS 4491 - Dr. Jose </a:t>
+            </a:r>
+            <a:r>
+              <a:rPr lang="en-US" sz="4400" dirty="0" err="1" smtClean="0">
+                <a:solidFill>
+                  <a:schemeClr val="accent1"/>
+                </a:solidFill>
+                <a:latin typeface="+mj-lt"/>
+              </a:rPr>
+              <a:t>Garrido</a:t>
+            </a:r>
+            <a:endParaRPr lang="en-US" sz="4400" dirty="0">
               <a:solidFill>
                 <a:schemeClr val="accent1"/>
               </a:solidFill>
               <a:latin typeface="+mj-lt"/>
             </a:endParaRPr>
           </a:p>
-          <a:p>
-            <a:r>
-              <a:rPr lang="en-US" dirty="0" smtClean="0">
-                <a:solidFill>
-                  <a:schemeClr val="accent1"/>
-                </a:solidFill>
-                <a:latin typeface="+mj-lt"/>
-              </a:rPr>
-              <a:t>By Nick Powers, and Jordan White</a:t>
-            </a:r>
-          </a:p>
-          <a:p>
-            <a:r>
-              <a:rPr lang="en-US" dirty="0" smtClean="0">
-                <a:solidFill>
-                  <a:schemeClr val="accent1"/>
-                </a:solidFill>
-                <a:latin typeface="+mj-lt"/>
-              </a:rPr>
-              <a:t>CS 4491 - Dr. Jose </a:t>
-            </a:r>
-            <a:r>
-              <a:rPr lang="en-US" dirty="0" err="1" smtClean="0">
-                <a:solidFill>
-                  <a:schemeClr val="accent1"/>
-                </a:solidFill>
-                <a:latin typeface="+mj-lt"/>
-              </a:rPr>
-              <a:t>Garrido</a:t>
-            </a:r>
-            <a:endParaRPr lang="en-US" dirty="0">
-              <a:solidFill>
-                <a:schemeClr val="accent1"/>
-              </a:solidFill>
-              <a:latin typeface="+mj-lt"/>
-            </a:endParaRPr>
-          </a:p>
         </p:txBody>
       </p:sp>
       <p:sp>
@@ -8956,7 +8939,7 @@
         <p:spPr>
           <a:xfrm>
             <a:off x="1063566" y="6172200"/>
-            <a:ext cx="8851443" cy="5478341"/>
+            <a:ext cx="8851443" cy="10210800"/>
           </a:xfrm>
           <a:prstGeom prst="rect">
             <a:avLst/>
@@ -8977,20 +8960,14 @@
               </a:lnSpc>
             </a:pPr>
             <a:r>
-              <a:rPr lang="en-US" dirty="0" smtClean="0">
+              <a:rPr lang="en-US" b="0" dirty="0" smtClean="0">
                 <a:solidFill>
                   <a:schemeClr val="accent1"/>
                 </a:solidFill>
                 <a:latin typeface="+mj-lt"/>
               </a:rPr>
-              <a:t>Introduction</a:t>
-            </a:r>
-            <a:endParaRPr lang="en-US" b="0" dirty="0" smtClean="0">
-              <a:solidFill>
-                <a:schemeClr val="accent1"/>
-              </a:solidFill>
-              <a:latin typeface="+mj-lt"/>
-            </a:endParaRPr>
+              <a:t>Project Overview</a:t>
+            </a:r>
           </a:p>
           <a:p>
             <a:pPr algn="l">
@@ -9005,14 +8982,30 @@
                 </a:solidFill>
                 <a:latin typeface="+mj-lt"/>
               </a:rPr>
-              <a:t>The following outlines the development of a process-based traffic simulation. Development consisted of devising a routing algorithm, and designing concurrent software.</a:t>
-            </a:r>
-          </a:p>
-        </p:txBody>
-      </p:sp>
-      <p:sp>
-        <p:nvSpPr>
-          <p:cNvPr id="87" name="TextBox 86"/>
+              <a:t>A traffic simulation can be used to design street networks that are efficient and provide sufficient capacity in certain scenarios. Important statistical information such as trip time between two points of interest and speed along certain roadways are useful when deciding how to improve an existing design.</a:t>
+            </a:r>
+          </a:p>
+          <a:p>
+            <a:pPr algn="l">
+              <a:lnSpc>
+                <a:spcPct val="100000"/>
+              </a:lnSpc>
+            </a:pPr>
+            <a:r>
+              <a:rPr lang="en-US" sz="3600" b="0" dirty="0" smtClean="0">
+                <a:solidFill>
+                  <a:schemeClr val="accent1"/>
+                </a:solidFill>
+                <a:latin typeface="+mj-lt"/>
+              </a:rPr>
+              <a:t>The following is an overview of the development of a process-based traffic simulation which includes devising a routing algorithm to help vehicles find their destination, and cooperative multi-threaded software.</a:t>
+            </a:r>
+          </a:p>
+        </p:txBody>
+      </p:sp>
+      <p:sp>
+        <p:nvSpPr>
+          <p:cNvPr id="88" name="TextBox 87"/>
           <p:cNvSpPr txBox="1">
             <a:spLocks/>
           </p:cNvSpPr>
@@ -9020,8 +9013,8 @@
         </p:nvSpPr>
         <p:spPr>
           <a:xfrm>
-            <a:off x="1052618" y="12192000"/>
-            <a:ext cx="8851443" cy="5478341"/>
+            <a:off x="21640800" y="16736462"/>
+            <a:ext cx="10439401" cy="15496138"/>
           </a:xfrm>
           <a:prstGeom prst="rect">
             <a:avLst/>
@@ -9041,14 +9034,170 @@
                 <a:spcPct val="100000"/>
               </a:lnSpc>
             </a:pPr>
+            <a:endParaRPr lang="en-US" sz="3600" b="0" dirty="0" smtClean="0">
+              <a:solidFill>
+                <a:schemeClr val="accent1"/>
+              </a:solidFill>
+              <a:latin typeface="+mn-lt"/>
+            </a:endParaRPr>
+          </a:p>
+          <a:p>
+            <a:pPr>
+              <a:lnSpc>
+                <a:spcPct val="100000"/>
+              </a:lnSpc>
+            </a:pPr>
+            <a:endParaRPr lang="en-US" sz="3600" b="0" dirty="0">
+              <a:solidFill>
+                <a:schemeClr val="accent1"/>
+              </a:solidFill>
+              <a:latin typeface="+mn-lt"/>
+            </a:endParaRPr>
+          </a:p>
+          <a:p>
+            <a:pPr>
+              <a:lnSpc>
+                <a:spcPct val="100000"/>
+              </a:lnSpc>
+            </a:pPr>
+            <a:endParaRPr lang="en-US" sz="3600" b="0" dirty="0" smtClean="0">
+              <a:solidFill>
+                <a:schemeClr val="accent1"/>
+              </a:solidFill>
+              <a:latin typeface="+mn-lt"/>
+            </a:endParaRPr>
+          </a:p>
+          <a:p>
+            <a:pPr>
+              <a:lnSpc>
+                <a:spcPct val="100000"/>
+              </a:lnSpc>
+            </a:pPr>
+            <a:endParaRPr lang="en-US" sz="3600" b="0" dirty="0">
+              <a:solidFill>
+                <a:schemeClr val="accent1"/>
+              </a:solidFill>
+              <a:latin typeface="+mn-lt"/>
+            </a:endParaRPr>
+          </a:p>
+          <a:p>
+            <a:pPr>
+              <a:lnSpc>
+                <a:spcPct val="100000"/>
+              </a:lnSpc>
+            </a:pPr>
+            <a:endParaRPr lang="en-US" sz="3600" b="0" dirty="0" smtClean="0">
+              <a:solidFill>
+                <a:schemeClr val="accent1"/>
+              </a:solidFill>
+              <a:latin typeface="+mn-lt"/>
+            </a:endParaRPr>
+          </a:p>
+          <a:p>
+            <a:pPr>
+              <a:lnSpc>
+                <a:spcPct val="100000"/>
+              </a:lnSpc>
+            </a:pPr>
+            <a:endParaRPr lang="en-US" sz="3600" b="0" dirty="0">
+              <a:solidFill>
+                <a:schemeClr val="accent1"/>
+              </a:solidFill>
+              <a:latin typeface="+mn-lt"/>
+            </a:endParaRPr>
+          </a:p>
+          <a:p>
+            <a:pPr>
+              <a:lnSpc>
+                <a:spcPct val="100000"/>
+              </a:lnSpc>
+            </a:pPr>
+            <a:endParaRPr lang="en-US" sz="3600" b="0" dirty="0" smtClean="0">
+              <a:solidFill>
+                <a:schemeClr val="accent1"/>
+              </a:solidFill>
+              <a:latin typeface="+mn-lt"/>
+            </a:endParaRPr>
+          </a:p>
+          <a:p>
+            <a:pPr>
+              <a:lnSpc>
+                <a:spcPct val="100000"/>
+              </a:lnSpc>
+            </a:pPr>
+            <a:endParaRPr lang="en-US" sz="3600" b="0" dirty="0">
+              <a:solidFill>
+                <a:schemeClr val="accent1"/>
+              </a:solidFill>
+              <a:latin typeface="+mn-lt"/>
+            </a:endParaRPr>
+          </a:p>
+          <a:p>
+            <a:pPr>
+              <a:lnSpc>
+                <a:spcPct val="100000"/>
+              </a:lnSpc>
+            </a:pPr>
+            <a:endParaRPr lang="en-US" sz="3600" b="0" dirty="0" smtClean="0">
+              <a:solidFill>
+                <a:schemeClr val="accent1"/>
+              </a:solidFill>
+              <a:latin typeface="+mn-lt"/>
+            </a:endParaRPr>
+          </a:p>
+          <a:p>
+            <a:pPr>
+              <a:lnSpc>
+                <a:spcPct val="100000"/>
+              </a:lnSpc>
+            </a:pPr>
+            <a:endParaRPr lang="en-US" sz="3600" b="0" dirty="0">
+              <a:solidFill>
+                <a:schemeClr val="accent1"/>
+              </a:solidFill>
+              <a:latin typeface="+mn-lt"/>
+            </a:endParaRPr>
+          </a:p>
+          <a:p>
+            <a:pPr>
+              <a:lnSpc>
+                <a:spcPct val="100000"/>
+              </a:lnSpc>
+            </a:pPr>
+            <a:endParaRPr lang="en-US" sz="3600" b="0" dirty="0" smtClean="0">
+              <a:solidFill>
+                <a:schemeClr val="accent1"/>
+              </a:solidFill>
+              <a:latin typeface="+mn-lt"/>
+            </a:endParaRPr>
+          </a:p>
+          <a:p>
+            <a:pPr>
+              <a:lnSpc>
+                <a:spcPct val="100000"/>
+              </a:lnSpc>
+            </a:pPr>
+            <a:endParaRPr lang="en-US" sz="3600" b="0" dirty="0" smtClean="0">
+              <a:solidFill>
+                <a:schemeClr val="accent1"/>
+              </a:solidFill>
+              <a:latin typeface="+mj-lt"/>
+            </a:endParaRPr>
+          </a:p>
+          <a:p>
+            <a:pPr>
+              <a:lnSpc>
+                <a:spcPct val="100000"/>
+              </a:lnSpc>
+            </a:pPr>
             <a:r>
               <a:rPr lang="en-US" b="0" dirty="0" smtClean="0">
                 <a:solidFill>
                   <a:schemeClr val="accent1"/>
                 </a:solidFill>
-                <a:latin typeface="+mj-lt"/>
+                <a:latin typeface="+mn-lt"/>
               </a:rPr>
-              <a:t>Routing Algorithm</a:t>
+              <a:t>Intersection Structure</a:t>
             </a:r>
           </a:p>
           <a:p>
@@ -9062,53 +9211,86 @@
                 <a:solidFill>
                   <a:schemeClr val="accent1"/>
                 </a:solidFill>
-                <a:latin typeface="+mj-lt"/>
+                <a:latin typeface="+mn-lt"/>
               </a:rPr>
-              <a:t>.</a:t>
-            </a:r>
-          </a:p>
-        </p:txBody>
-      </p:sp>
-      <p:sp>
-        <p:nvSpPr>
-          <p:cNvPr id="88" name="TextBox 87"/>
-          <p:cNvSpPr txBox="1">
-            <a:spLocks/>
-          </p:cNvSpPr>
-          <p:nvPr/>
-        </p:nvSpPr>
-        <p:spPr>
-          <a:xfrm>
-            <a:off x="1052617" y="18211800"/>
-            <a:ext cx="8851443" cy="10363200"/>
-          </a:xfrm>
-          <a:prstGeom prst="rect">
-            <a:avLst/>
-          </a:prstGeom>
-          <a:solidFill>
-            <a:schemeClr val="bg2"/>
-          </a:solidFill>
-        </p:spPr>
-        <p:txBody>
-          <a:bodyPr wrap="square" lIns="457200" tIns="228600" rIns="457200" bIns="228600" rtlCol="0">
-            <a:noAutofit/>
-          </a:bodyPr>
-          <a:lstStyle/>
+              <a:t>The intersection contains an array of four </a:t>
+            </a:r>
+            <a:r>
+              <a:rPr lang="en-US" sz="3600" b="0" dirty="0" err="1" smtClean="0">
+                <a:solidFill>
+                  <a:schemeClr val="accent1"/>
+                </a:solidFill>
+                <a:latin typeface="+mn-lt"/>
+              </a:rPr>
+              <a:t>nullable</a:t>
+            </a:r>
+            <a:r>
+              <a:rPr lang="en-US" sz="3600" b="0" dirty="0" smtClean="0">
+                <a:solidFill>
+                  <a:schemeClr val="accent1"/>
+                </a:solidFill>
+                <a:latin typeface="+mn-lt"/>
+              </a:rPr>
+              <a:t> </a:t>
+            </a:r>
+            <a:r>
+              <a:rPr lang="en-US" sz="3600" b="0" dirty="0" err="1" smtClean="0">
+                <a:solidFill>
+                  <a:schemeClr val="accent1"/>
+                </a:solidFill>
+                <a:latin typeface="+mn-lt"/>
+              </a:rPr>
+              <a:t>IntersectionInlets</a:t>
+            </a:r>
+            <a:r>
+              <a:rPr lang="en-US" sz="3600" b="0" dirty="0" smtClean="0">
+                <a:solidFill>
+                  <a:schemeClr val="accent1"/>
+                </a:solidFill>
+                <a:latin typeface="+mn-lt"/>
+              </a:rPr>
+              <a:t>. In cases where the intersection is a 3-way intersection one of the elements in the inlet array are null. Depending on the state of </a:t>
+            </a:r>
+            <a:r>
+              <a:rPr lang="en-US" sz="3600" b="0" smtClean="0">
+                <a:solidFill>
+                  <a:schemeClr val="accent1"/>
+                </a:solidFill>
+                <a:latin typeface="+mn-lt"/>
+              </a:rPr>
+              <a:t>the </a:t>
+            </a:r>
+            <a:r>
+              <a:rPr lang="en-US" sz="3600" b="0" smtClean="0">
+                <a:solidFill>
+                  <a:schemeClr val="accent1"/>
+                </a:solidFill>
+                <a:latin typeface="+mn-lt"/>
+              </a:rPr>
+              <a:t>street </a:t>
+            </a:r>
+            <a:r>
+              <a:rPr lang="en-US" sz="3600" b="0" dirty="0" smtClean="0">
+                <a:solidFill>
+                  <a:schemeClr val="accent1"/>
+                </a:solidFill>
+                <a:latin typeface="+mn-lt"/>
+              </a:rPr>
+              <a:t>lights at the intersection vehicles are transferred from an inlet to an adjacent intersections inlet.</a:t>
+            </a:r>
+          </a:p>
           <a:p>
             <a:pPr>
               <a:lnSpc>
                 <a:spcPct val="100000"/>
               </a:lnSpc>
             </a:pPr>
-            <a:r>
-              <a:rPr lang="en-US" b="0" dirty="0" smtClean="0">
-                <a:solidFill>
-                  <a:schemeClr val="accent1"/>
-                </a:solidFill>
-                <a:latin typeface="+mj-lt"/>
-              </a:rPr>
-              <a:t>Intersection</a:t>
-            </a:r>
+            <a:endParaRPr lang="en-US" sz="3600" b="0" dirty="0" smtClean="0">
+              <a:solidFill>
+                <a:schemeClr val="accent1"/>
+              </a:solidFill>
+              <a:latin typeface="+mn-lt"/>
+            </a:endParaRPr>
           </a:p>
           <a:p>
             <a:pPr>
@@ -9116,11 +9298,11 @@
                 <a:spcPct val="100000"/>
               </a:lnSpc>
             </a:pPr>
-            <a:endParaRPr lang="en-US" b="0" dirty="0">
+            <a:endParaRPr lang="en-US" sz="3600" b="0" dirty="0">
               <a:solidFill>
                 <a:schemeClr val="accent1"/>
               </a:solidFill>
-              <a:latin typeface="+mj-lt"/>
+              <a:latin typeface="+mn-lt"/>
             </a:endParaRPr>
           </a:p>
           <a:p>
@@ -9129,11 +9311,11 @@
                 <a:spcPct val="100000"/>
               </a:lnSpc>
             </a:pPr>
-            <a:endParaRPr lang="en-US" b="0" dirty="0" smtClean="0">
+            <a:endParaRPr lang="en-US" sz="3600" b="0" dirty="0" smtClean="0">
               <a:solidFill>
                 <a:schemeClr val="accent1"/>
               </a:solidFill>
-              <a:latin typeface="+mj-lt"/>
+              <a:latin typeface="+mn-lt"/>
             </a:endParaRPr>
           </a:p>
           <a:p>
@@ -9142,11 +9324,11 @@
                 <a:spcPct val="100000"/>
               </a:lnSpc>
             </a:pPr>
-            <a:endParaRPr lang="en-US" b="0" dirty="0" smtClean="0">
+            <a:endParaRPr lang="en-US" sz="3600" b="0" dirty="0" smtClean="0">
               <a:solidFill>
                 <a:schemeClr val="accent1"/>
               </a:solidFill>
-              <a:latin typeface="+mj-lt"/>
+              <a:latin typeface="+mn-lt"/>
             </a:endParaRPr>
           </a:p>
           <a:p>
@@ -9155,11 +9337,11 @@
                 <a:spcPct val="100000"/>
               </a:lnSpc>
             </a:pPr>
-            <a:endParaRPr lang="en-US" b="0" dirty="0" smtClean="0">
+            <a:endParaRPr lang="en-US" sz="3600" b="0" dirty="0" smtClean="0">
               <a:solidFill>
                 <a:schemeClr val="accent1"/>
               </a:solidFill>
-              <a:latin typeface="+mj-lt"/>
+              <a:latin typeface="+mn-lt"/>
             </a:endParaRPr>
           </a:p>
           <a:p>
@@ -9172,7 +9354,7 @@
               <a:solidFill>
                 <a:schemeClr val="accent1"/>
               </a:solidFill>
-              <a:latin typeface="+mj-lt"/>
+              <a:latin typeface="+mn-lt"/>
             </a:endParaRPr>
           </a:p>
         </p:txBody>
@@ -9199,8 +9381,8 @@
         </p:blipFill>
         <p:spPr>
           <a:xfrm>
-            <a:off x="2895600" y="19278600"/>
-            <a:ext cx="5101602" cy="4800600"/>
+            <a:off x="22402800" y="17678400"/>
+            <a:ext cx="9022554" cy="8490210"/>
           </a:xfrm>
           <a:prstGeom prst="rect">
             <a:avLst/>
@@ -9238,15 +9420,6 @@
                 <a:spcPct val="100000"/>
               </a:lnSpc>
             </a:pPr>
-            <a:r>
-              <a:rPr lang="en-US" b="0" dirty="0" smtClean="0">
-                <a:solidFill>
-                  <a:schemeClr val="accent1"/>
-                </a:solidFill>
-                <a:latin typeface="+mj-lt"/>
-              </a:rPr>
-              <a:t>Images</a:t>
-            </a:r>
             <a:endParaRPr lang="en-US" b="0" dirty="0" smtClean="0">
               <a:solidFill>
                 <a:schemeClr val="accent1"/>
@@ -9266,8 +9439,8 @@
         </p:nvSpPr>
         <p:spPr>
           <a:xfrm>
-            <a:off x="11780518" y="16764000"/>
-            <a:ext cx="14554200" cy="8420100"/>
+            <a:off x="11810999" y="16736462"/>
+            <a:ext cx="8991601" cy="14657938"/>
           </a:xfrm>
           <a:prstGeom prst="rect">
             <a:avLst/>
@@ -9294,7 +9467,7 @@
                 </a:solidFill>
                 <a:latin typeface="+mj-lt"/>
               </a:rPr>
-              <a:t>The Interface so far</a:t>
+              <a:t>Intersection</a:t>
             </a:r>
           </a:p>
           <a:p>
@@ -9308,9 +9481,133 @@
                 <a:solidFill>
                   <a:schemeClr val="accent1"/>
                 </a:solidFill>
-                <a:latin typeface="+mj-lt"/>
+                <a:latin typeface="+mn-lt"/>
               </a:rPr>
-              <a:t>.</a:t>
+              <a:t>Intersections are used in any part of the street network that involves a change in structure. Those include points where lane(s) are added or removed, intersections, and points of </a:t>
+            </a:r>
+            <a:r>
+              <a:rPr lang="en-US" sz="3600" b="0" dirty="0" err="1" smtClean="0">
+                <a:solidFill>
+                  <a:schemeClr val="accent1"/>
+                </a:solidFill>
+                <a:latin typeface="+mn-lt"/>
+              </a:rPr>
+              <a:t>intersest</a:t>
+            </a:r>
+            <a:r>
+              <a:rPr lang="en-US" sz="3600" b="0" dirty="0" smtClean="0">
+                <a:solidFill>
+                  <a:schemeClr val="accent1"/>
+                </a:solidFill>
+                <a:latin typeface="+mn-lt"/>
+              </a:rPr>
+              <a:t>. In cases where the intersection is a point of interest vehicles will be added or removed from the simulation. When the intersection is neither a point of interest nor a lane expansion it behaves as a normal intersection where street lights dictate the transferring of vehicles.</a:t>
+            </a:r>
+          </a:p>
+          <a:p>
+            <a:pPr algn="l">
+              <a:lnSpc>
+                <a:spcPct val="100000"/>
+              </a:lnSpc>
+            </a:pPr>
+            <a:r>
+              <a:rPr lang="en-US" sz="3600" b="0" dirty="0" smtClean="0">
+                <a:solidFill>
+                  <a:schemeClr val="accent1"/>
+                </a:solidFill>
+                <a:latin typeface="+mn-lt"/>
+              </a:rPr>
+              <a:t>The intersection object is ran by a thread. This requires that </a:t>
+            </a:r>
+            <a:r>
+              <a:rPr lang="en-US" sz="3600" b="0" dirty="0" err="1" smtClean="0">
+                <a:solidFill>
+                  <a:schemeClr val="accent1"/>
+                </a:solidFill>
+                <a:latin typeface="+mn-lt"/>
+              </a:rPr>
+              <a:t>LaneQueues</a:t>
+            </a:r>
+            <a:r>
+              <a:rPr lang="en-US" sz="3600" b="0" dirty="0" smtClean="0">
+                <a:solidFill>
+                  <a:schemeClr val="accent1"/>
+                </a:solidFill>
+                <a:latin typeface="+mn-lt"/>
+              </a:rPr>
+              <a:t> that enter the intersection be locked before using. The destination </a:t>
+            </a:r>
+            <a:r>
+              <a:rPr lang="en-US" sz="3600" b="0" dirty="0" err="1" smtClean="0">
+                <a:solidFill>
+                  <a:schemeClr val="accent1"/>
+                </a:solidFill>
+                <a:latin typeface="+mn-lt"/>
+              </a:rPr>
+              <a:t>LaneQueue</a:t>
+            </a:r>
+            <a:r>
+              <a:rPr lang="en-US" sz="3600" b="0" dirty="0" smtClean="0">
+                <a:solidFill>
+                  <a:schemeClr val="accent1"/>
+                </a:solidFill>
+                <a:latin typeface="+mn-lt"/>
+              </a:rPr>
+              <a:t> must be locked as well to prevent race conditions. To prevent deadlock of the simulation in situations where the </a:t>
+            </a:r>
+            <a:r>
+              <a:rPr lang="en-US" sz="3600" b="0" dirty="0" err="1" smtClean="0">
+                <a:solidFill>
+                  <a:schemeClr val="accent1"/>
+                </a:solidFill>
+                <a:latin typeface="+mn-lt"/>
+              </a:rPr>
+              <a:t>LaneQueue</a:t>
+            </a:r>
+            <a:r>
+              <a:rPr lang="en-US" sz="3600" b="0" dirty="0" smtClean="0">
+                <a:solidFill>
+                  <a:schemeClr val="accent1"/>
+                </a:solidFill>
+                <a:latin typeface="+mn-lt"/>
+              </a:rPr>
+              <a:t> graph consists of circular paths, vehicles are </a:t>
+            </a:r>
+            <a:r>
+              <a:rPr lang="en-US" sz="3600" b="0" dirty="0" err="1" smtClean="0">
+                <a:solidFill>
+                  <a:schemeClr val="accent1"/>
+                </a:solidFill>
+                <a:latin typeface="+mn-lt"/>
+              </a:rPr>
+              <a:t>dequeued</a:t>
+            </a:r>
+            <a:r>
+              <a:rPr lang="en-US" sz="3600" b="0" dirty="0" smtClean="0">
+                <a:solidFill>
+                  <a:schemeClr val="accent1"/>
+                </a:solidFill>
+                <a:latin typeface="+mn-lt"/>
+              </a:rPr>
+              <a:t> from the source </a:t>
+            </a:r>
+            <a:r>
+              <a:rPr lang="en-US" sz="3600" b="0" dirty="0" err="1" smtClean="0">
+                <a:solidFill>
+                  <a:schemeClr val="accent1"/>
+                </a:solidFill>
+                <a:latin typeface="+mn-lt"/>
+              </a:rPr>
+              <a:t>laneQueue</a:t>
+            </a:r>
+            <a:r>
+              <a:rPr lang="en-US" sz="3600" b="0" dirty="0" smtClean="0">
+                <a:solidFill>
+                  <a:schemeClr val="accent1"/>
+                </a:solidFill>
+                <a:latin typeface="+mn-lt"/>
+              </a:rPr>
+              <a:t> and stored temporarily to unlock the source queue.</a:t>
             </a:r>
           </a:p>
         </p:txBody>
@@ -9326,7 +9623,7 @@
         <p:spPr>
           <a:xfrm>
             <a:off x="33985200" y="914400"/>
-            <a:ext cx="8851443" cy="10363200"/>
+            <a:ext cx="8851443" cy="18973800"/>
           </a:xfrm>
           <a:prstGeom prst="rect">
             <a:avLst/>
@@ -9375,14 +9672,92 @@
                 </a:solidFill>
                 <a:latin typeface="+mj-lt"/>
               </a:rPr>
-              <a:t>A routing algorithm was developed to  help vehicles navigate the road network to their destination. Storing the road network as a directed graph allows us to use the Bellman Ford algorithm to compute the minimum cost between every two nodes. Using that information a next-hop matrix is constructed where each element represents the adjacent node to travel to from any given node.</a:t>
-            </a:r>
-            <a:endParaRPr lang="en-US" sz="3600" b="0" dirty="0" smtClean="0">
-              <a:solidFill>
-                <a:schemeClr val="accent1"/>
-              </a:solidFill>
-              <a:latin typeface="+mj-lt"/>
-            </a:endParaRPr>
+              <a:t>A routing algorithm was developed to  help vehicles navigate the graph of </a:t>
+            </a:r>
+            <a:r>
+              <a:rPr lang="en-US" sz="3600" b="0" dirty="0" err="1" smtClean="0">
+                <a:solidFill>
+                  <a:schemeClr val="accent1"/>
+                </a:solidFill>
+                <a:latin typeface="+mj-lt"/>
+              </a:rPr>
+              <a:t>LaneQueues</a:t>
+            </a:r>
+            <a:r>
+              <a:rPr lang="en-US" sz="3600" b="0" dirty="0" smtClean="0">
+                <a:solidFill>
+                  <a:schemeClr val="accent1"/>
+                </a:solidFill>
+                <a:latin typeface="+mj-lt"/>
+              </a:rPr>
+              <a:t>. Storing the street network as a directed graph allows us to use the Bellman Ford algorithm to compute the minimum cost between every two nodes. Using that information a next-hop matrix is constructed where each element represents the adjacent node to travel to from any given node. </a:t>
+            </a:r>
+          </a:p>
+          <a:p>
+            <a:pPr algn="l">
+              <a:lnSpc>
+                <a:spcPct val="100000"/>
+              </a:lnSpc>
+            </a:pPr>
+            <a:r>
+              <a:rPr lang="en-US" sz="3600" b="0" dirty="0" smtClean="0">
+                <a:solidFill>
+                  <a:schemeClr val="accent1"/>
+                </a:solidFill>
+                <a:latin typeface="+mj-lt"/>
+              </a:rPr>
+              <a:t>To construct the next-hop matrix the cost to get to the destination of every adjacent node is sorted. The node can then be prioritized by the position their cost has in the sorted cost values. By storing more than just one next-hop matrix vehicles can take detours in situations of deadlock.</a:t>
+            </a:r>
+          </a:p>
+          <a:p>
+            <a:pPr algn="l">
+              <a:lnSpc>
+                <a:spcPct val="100000"/>
+              </a:lnSpc>
+            </a:pPr>
+            <a:r>
+              <a:rPr lang="en-US" sz="3600" b="0" dirty="0" smtClean="0">
+                <a:solidFill>
+                  <a:schemeClr val="accent1"/>
+                </a:solidFill>
+                <a:latin typeface="+mj-lt"/>
+              </a:rPr>
+              <a:t>The reference to the destination </a:t>
+            </a:r>
+            <a:r>
+              <a:rPr lang="en-US" sz="3600" b="0" dirty="0" err="1" smtClean="0">
+                <a:solidFill>
+                  <a:schemeClr val="accent1"/>
+                </a:solidFill>
+                <a:latin typeface="+mj-lt"/>
+              </a:rPr>
+              <a:t>LaneQueue</a:t>
+            </a:r>
+            <a:r>
+              <a:rPr lang="en-US" sz="3600" b="0" dirty="0" smtClean="0">
+                <a:solidFill>
+                  <a:schemeClr val="accent1"/>
+                </a:solidFill>
+                <a:latin typeface="+mj-lt"/>
+              </a:rPr>
+              <a:t> is automatically acquired when querying the optimal next-hop to take given the start and destination.</a:t>
+            </a:r>
+          </a:p>
+          <a:p>
+            <a:pPr algn="l">
+              <a:lnSpc>
+                <a:spcPct val="100000"/>
+              </a:lnSpc>
+            </a:pPr>
+            <a:r>
+              <a:rPr lang="en-US" sz="3600" b="0" dirty="0" smtClean="0">
+                <a:solidFill>
+                  <a:schemeClr val="accent1"/>
+                </a:solidFill>
+                <a:latin typeface="+mj-lt"/>
+              </a:rPr>
+              <a:t>Since most nodes within the graph are not final destinations the next-hop matrix is allowed to contain null columns. This saves a large amount of space since there are multiple next-hop matrices stored throughout the duration of the simulation.</a:t>
+            </a:r>
           </a:p>
         </p:txBody>
       </p:sp>
@@ -9417,15 +9792,6 @@
                 <a:spcPct val="100000"/>
               </a:lnSpc>
             </a:pPr>
-            <a:r>
-              <a:rPr lang="en-US" b="0" dirty="0" smtClean="0">
-                <a:solidFill>
-                  <a:schemeClr val="accent1"/>
-                </a:solidFill>
-                <a:latin typeface="+mj-lt"/>
-              </a:rPr>
-              <a:t>Intersections</a:t>
-            </a:r>
             <a:endParaRPr lang="en-US" b="0" dirty="0" smtClean="0">
               <a:solidFill>
                 <a:schemeClr val="accent1"/>
@@ -9457,7 +9823,7 @@
         </p:blipFill>
         <p:spPr>
           <a:xfrm>
-            <a:off x="13986670" y="6553200"/>
+            <a:off x="14043572" y="5723162"/>
             <a:ext cx="3432667" cy="1305657"/>
           </a:xfrm>
           <a:prstGeom prst="rect">
@@ -9487,7 +9853,7 @@
         </p:blipFill>
         <p:spPr>
           <a:xfrm>
-            <a:off x="13986670" y="7843481"/>
+            <a:off x="14043572" y="7013443"/>
             <a:ext cx="3432667" cy="1305656"/>
           </a:xfrm>
           <a:prstGeom prst="rect">
@@ -9571,7 +9937,7 @@
         </p:blipFill>
         <p:spPr>
           <a:xfrm>
-            <a:off x="19809591" y="8585233"/>
+            <a:off x="19691582" y="6614335"/>
             <a:ext cx="11889609" cy="6811929"/>
           </a:xfrm>
           <a:prstGeom prst="rect">
@@ -9579,6 +9945,352 @@
           </a:prstGeom>
         </p:spPr>
       </p:pic>
+      <p:sp>
+        <p:nvSpPr>
+          <p:cNvPr id="18" name="TextBox 13"/>
+          <p:cNvSpPr txBox="1">
+            <a:spLocks/>
+          </p:cNvSpPr>
+          <p:nvPr/>
+        </p:nvSpPr>
+        <p:spPr>
+          <a:xfrm>
+            <a:off x="1063565" y="17302519"/>
+            <a:ext cx="8851443" cy="13868400"/>
+          </a:xfrm>
+          <a:prstGeom prst="rect">
+            <a:avLst/>
+          </a:prstGeom>
+          <a:solidFill>
+            <a:schemeClr val="bg2"/>
+          </a:solidFill>
+        </p:spPr>
+        <p:txBody>
+          <a:bodyPr wrap="square" lIns="457200" tIns="228600" rIns="457200" bIns="228600" rtlCol="0">
+            <a:noAutofit/>
+          </a:bodyPr>
+          <a:lstStyle>
+            <a:defPPr>
+              <a:defRPr lang="en-US"/>
+            </a:defPPr>
+            <a:lvl1pPr algn="ctr" rtl="0" eaLnBrk="0" fontAlgn="base" hangingPunct="0">
+              <a:lnSpc>
+                <a:spcPct val="65000"/>
+              </a:lnSpc>
+              <a:spcBef>
+                <a:spcPct val="50000"/>
+              </a:spcBef>
+              <a:spcAft>
+                <a:spcPct val="0"/>
+              </a:spcAft>
+              <a:defRPr sz="5400" b="1" kern="1200">
+                <a:solidFill>
+                  <a:schemeClr val="tx1"/>
+                </a:solidFill>
+                <a:latin typeface="Times New Roman" pitchFamily="18" charset="0"/>
+                <a:ea typeface="+mn-ea"/>
+                <a:cs typeface="+mn-cs"/>
+              </a:defRPr>
+            </a:lvl1pPr>
+            <a:lvl2pPr marL="457200" algn="ctr" rtl="0" eaLnBrk="0" fontAlgn="base" hangingPunct="0">
+              <a:lnSpc>
+                <a:spcPct val="65000"/>
+              </a:lnSpc>
+              <a:spcBef>
+                <a:spcPct val="50000"/>
+              </a:spcBef>
+              <a:spcAft>
+                <a:spcPct val="0"/>
+              </a:spcAft>
+              <a:defRPr sz="5400" b="1" kern="1200">
+                <a:solidFill>
+                  <a:schemeClr val="tx1"/>
+                </a:solidFill>
+                <a:latin typeface="Times New Roman" pitchFamily="18" charset="0"/>
+                <a:ea typeface="+mn-ea"/>
+                <a:cs typeface="+mn-cs"/>
+              </a:defRPr>
+            </a:lvl2pPr>
+            <a:lvl3pPr marL="914400" algn="ctr" rtl="0" eaLnBrk="0" fontAlgn="base" hangingPunct="0">
+              <a:lnSpc>
+                <a:spcPct val="65000"/>
+              </a:lnSpc>
+              <a:spcBef>
+                <a:spcPct val="50000"/>
+              </a:spcBef>
+              <a:spcAft>
+                <a:spcPct val="0"/>
+              </a:spcAft>
+              <a:defRPr sz="5400" b="1" kern="1200">
+                <a:solidFill>
+                  <a:schemeClr val="tx1"/>
+                </a:solidFill>
+                <a:latin typeface="Times New Roman" pitchFamily="18" charset="0"/>
+                <a:ea typeface="+mn-ea"/>
+                <a:cs typeface="+mn-cs"/>
+              </a:defRPr>
+            </a:lvl3pPr>
+            <a:lvl4pPr marL="1371600" algn="ctr" rtl="0" eaLnBrk="0" fontAlgn="base" hangingPunct="0">
+              <a:lnSpc>
+                <a:spcPct val="65000"/>
+              </a:lnSpc>
+              <a:spcBef>
+                <a:spcPct val="50000"/>
+              </a:spcBef>
+              <a:spcAft>
+                <a:spcPct val="0"/>
+              </a:spcAft>
+              <a:defRPr sz="5400" b="1" kern="1200">
+                <a:solidFill>
+                  <a:schemeClr val="tx1"/>
+                </a:solidFill>
+                <a:latin typeface="Times New Roman" pitchFamily="18" charset="0"/>
+                <a:ea typeface="+mn-ea"/>
+                <a:cs typeface="+mn-cs"/>
+              </a:defRPr>
+            </a:lvl4pPr>
+            <a:lvl5pPr marL="1828800" algn="ctr" rtl="0" eaLnBrk="0" fontAlgn="base" hangingPunct="0">
+              <a:lnSpc>
+                <a:spcPct val="65000"/>
+              </a:lnSpc>
+              <a:spcBef>
+                <a:spcPct val="50000"/>
+              </a:spcBef>
+              <a:spcAft>
+                <a:spcPct val="0"/>
+              </a:spcAft>
+              <a:defRPr sz="5400" b="1" kern="1200">
+                <a:solidFill>
+                  <a:schemeClr val="tx1"/>
+                </a:solidFill>
+                <a:latin typeface="Times New Roman" pitchFamily="18" charset="0"/>
+                <a:ea typeface="+mn-ea"/>
+                <a:cs typeface="+mn-cs"/>
+              </a:defRPr>
+            </a:lvl5pPr>
+            <a:lvl6pPr marL="2286000" algn="l" defTabSz="914400" rtl="0" eaLnBrk="1" latinLnBrk="0" hangingPunct="1">
+              <a:defRPr sz="5400" b="1" kern="1200">
+                <a:solidFill>
+                  <a:schemeClr val="tx1"/>
+                </a:solidFill>
+                <a:latin typeface="Times New Roman" pitchFamily="18" charset="0"/>
+                <a:ea typeface="+mn-ea"/>
+                <a:cs typeface="+mn-cs"/>
+              </a:defRPr>
+            </a:lvl6pPr>
+            <a:lvl7pPr marL="2743200" algn="l" defTabSz="914400" rtl="0" eaLnBrk="1" latinLnBrk="0" hangingPunct="1">
+              <a:defRPr sz="5400" b="1" kern="1200">
+                <a:solidFill>
+                  <a:schemeClr val="tx1"/>
+                </a:solidFill>
+                <a:latin typeface="Times New Roman" pitchFamily="18" charset="0"/>
+                <a:ea typeface="+mn-ea"/>
+                <a:cs typeface="+mn-cs"/>
+              </a:defRPr>
+            </a:lvl7pPr>
+            <a:lvl8pPr marL="3200400" algn="l" defTabSz="914400" rtl="0" eaLnBrk="1" latinLnBrk="0" hangingPunct="1">
+              <a:defRPr sz="5400" b="1" kern="1200">
+                <a:solidFill>
+                  <a:schemeClr val="tx1"/>
+                </a:solidFill>
+                <a:latin typeface="Times New Roman" pitchFamily="18" charset="0"/>
+                <a:ea typeface="+mn-ea"/>
+                <a:cs typeface="+mn-cs"/>
+              </a:defRPr>
+            </a:lvl8pPr>
+            <a:lvl9pPr marL="3657600" algn="l" defTabSz="914400" rtl="0" eaLnBrk="1" latinLnBrk="0" hangingPunct="1">
+              <a:defRPr sz="5400" b="1" kern="1200">
+                <a:solidFill>
+                  <a:schemeClr val="tx1"/>
+                </a:solidFill>
+                <a:latin typeface="Times New Roman" pitchFamily="18" charset="0"/>
+                <a:ea typeface="+mn-ea"/>
+                <a:cs typeface="+mn-cs"/>
+              </a:defRPr>
+            </a:lvl9pPr>
+          </a:lstStyle>
+          <a:p>
+            <a:pPr>
+              <a:lnSpc>
+                <a:spcPct val="100000"/>
+              </a:lnSpc>
+            </a:pPr>
+            <a:r>
+              <a:rPr lang="en-US" b="0" dirty="0" smtClean="0">
+                <a:solidFill>
+                  <a:schemeClr val="accent1"/>
+                </a:solidFill>
+                <a:latin typeface="+mj-lt"/>
+              </a:rPr>
+              <a:t>Street Network</a:t>
+            </a:r>
+            <a:endParaRPr lang="en-US" b="0" dirty="0">
+              <a:solidFill>
+                <a:schemeClr val="accent1"/>
+              </a:solidFill>
+              <a:latin typeface="+mj-lt"/>
+            </a:endParaRPr>
+          </a:p>
+          <a:p>
+            <a:pPr algn="l">
+              <a:lnSpc>
+                <a:spcPct val="100000"/>
+              </a:lnSpc>
+            </a:pPr>
+            <a:r>
+              <a:rPr lang="en-US" sz="3600" b="0" dirty="0" smtClean="0">
+                <a:solidFill>
+                  <a:schemeClr val="accent1"/>
+                </a:solidFill>
+                <a:latin typeface="+mj-lt"/>
+              </a:rPr>
+              <a:t>The street network is represented by multiple levels of graphs. The highest level is a directed graph where intersections are nodes and roadways are edges. The second level graph represents lanes where nodes are the lane body or </a:t>
+            </a:r>
+            <a:r>
+              <a:rPr lang="en-US" sz="3600" b="0" dirty="0" err="1" smtClean="0">
+                <a:solidFill>
+                  <a:schemeClr val="accent1"/>
+                </a:solidFill>
+                <a:latin typeface="+mj-lt"/>
+              </a:rPr>
+              <a:t>LaneQueue</a:t>
+            </a:r>
+            <a:r>
+              <a:rPr lang="en-US" sz="3600" b="0" dirty="0" smtClean="0">
+                <a:solidFill>
+                  <a:schemeClr val="accent1"/>
+                </a:solidFill>
+                <a:latin typeface="+mj-lt"/>
+              </a:rPr>
+              <a:t> and edges are the paths vehicles can take to transfer to another lane. A multi-lane roadway would therefore consist of multiple nodes. We will later see how these graphs are constructed from a given roadway.</a:t>
+            </a:r>
+          </a:p>
+          <a:p>
+            <a:pPr algn="l">
+              <a:lnSpc>
+                <a:spcPct val="100000"/>
+              </a:lnSpc>
+            </a:pPr>
+            <a:r>
+              <a:rPr lang="en-US" sz="3600" b="0" dirty="0" err="1" smtClean="0">
+                <a:solidFill>
+                  <a:schemeClr val="accent1"/>
+                </a:solidFill>
+                <a:latin typeface="+mj-lt"/>
+              </a:rPr>
+              <a:t>LaneQueues</a:t>
+            </a:r>
+            <a:r>
+              <a:rPr lang="en-US" sz="3600" b="0" dirty="0" smtClean="0">
+                <a:solidFill>
+                  <a:schemeClr val="accent1"/>
+                </a:solidFill>
+                <a:latin typeface="+mj-lt"/>
+              </a:rPr>
+              <a:t> are passive objects that behave like a queue. Since vehicles have varying length the </a:t>
+            </a:r>
+            <a:r>
+              <a:rPr lang="en-US" sz="3600" b="0" dirty="0" err="1" smtClean="0">
+                <a:solidFill>
+                  <a:schemeClr val="accent1"/>
+                </a:solidFill>
+                <a:latin typeface="+mj-lt"/>
+              </a:rPr>
+              <a:t>LaneQueue</a:t>
+            </a:r>
+            <a:r>
+              <a:rPr lang="en-US" sz="3600" b="0" dirty="0" smtClean="0">
+                <a:solidFill>
+                  <a:schemeClr val="accent1"/>
+                </a:solidFill>
+                <a:latin typeface="+mj-lt"/>
+              </a:rPr>
+              <a:t> needs to store more information than a conventional queue such as the sum of all the vehicle lengths within the queue. Intersections use these objects to buffer vehicles before routing them to their next destination.</a:t>
+            </a:r>
+          </a:p>
+        </p:txBody>
+      </p:sp>
+      <p:sp>
+        <p:nvSpPr>
+          <p:cNvPr id="19" name="TextBox 18"/>
+          <p:cNvSpPr txBox="1">
+            <a:spLocks/>
+          </p:cNvSpPr>
+          <p:nvPr/>
+        </p:nvSpPr>
+        <p:spPr>
+          <a:xfrm>
+            <a:off x="33985200" y="20883919"/>
+            <a:ext cx="8851443" cy="10287000"/>
+          </a:xfrm>
+          <a:prstGeom prst="rect">
+            <a:avLst/>
+          </a:prstGeom>
+          <a:solidFill>
+            <a:schemeClr val="bg2"/>
+          </a:solidFill>
+        </p:spPr>
+        <p:txBody>
+          <a:bodyPr wrap="square" lIns="457200" tIns="228600" rIns="457200" bIns="228600" rtlCol="0">
+            <a:noAutofit/>
+          </a:bodyPr>
+          <a:lstStyle/>
+          <a:p>
+            <a:pPr>
+              <a:lnSpc>
+                <a:spcPct val="100000"/>
+              </a:lnSpc>
+            </a:pPr>
+            <a:r>
+              <a:rPr lang="en-US" b="0" dirty="0" smtClean="0">
+                <a:solidFill>
+                  <a:schemeClr val="accent1"/>
+                </a:solidFill>
+                <a:latin typeface="+mj-lt"/>
+              </a:rPr>
+              <a:t>Simulation Results</a:t>
+            </a:r>
+            <a:endParaRPr lang="en-US" b="0" dirty="0">
+              <a:solidFill>
+                <a:schemeClr val="accent1"/>
+              </a:solidFill>
+              <a:latin typeface="+mj-lt"/>
+            </a:endParaRPr>
+          </a:p>
+          <a:p>
+            <a:pPr algn="l">
+              <a:lnSpc>
+                <a:spcPct val="100000"/>
+              </a:lnSpc>
+            </a:pPr>
+            <a:r>
+              <a:rPr lang="en-US" sz="3600" b="0" dirty="0" smtClean="0">
+                <a:solidFill>
+                  <a:schemeClr val="accent1"/>
+                </a:solidFill>
+                <a:latin typeface="+mj-lt"/>
+              </a:rPr>
+              <a:t>Statistical information about average wait time will be recorded for each intersection. When the simulation is stopped the user will be able to observe the data through the GUI constructed using the Unity3d engine.</a:t>
+            </a:r>
+          </a:p>
+          <a:p>
+            <a:pPr algn="l">
+              <a:lnSpc>
+                <a:spcPct val="100000"/>
+              </a:lnSpc>
+            </a:pPr>
+            <a:r>
+              <a:rPr lang="en-US" sz="3600" b="0" dirty="0" smtClean="0">
+                <a:solidFill>
+                  <a:schemeClr val="accent1"/>
+                </a:solidFill>
+                <a:latin typeface="+mj-lt"/>
+              </a:rPr>
+              <a:t>Points of interest will provide statistical information about the average trip time between them and their respective destination points of interest. This information is presented as a labeled graph where the directed edges represent the trip between both endpoints of the edge and the label will present the average trip time.</a:t>
+            </a:r>
+          </a:p>
+        </p:txBody>
+      </p:sp>
     </p:spTree>
   </p:cSld>
   <p:clrMapOvr>

</xml_diff>